<commit_message>
updated app with insert feature
</commit_message>
<xml_diff>
--- a/capstone/tech-demo.pptx
+++ b/capstone/tech-demo.pptx
@@ -4000,9 +4000,10 @@
               <a:buAutoNum type="arabicPeriod"/>
             </a:pPr>
             <a:r>
-              <a:rPr lang="en-US" dirty="0" smtClean="0"/>
-              <a:t>Add tips/uses of items in item page</a:t>
-            </a:r>
+              <a:rPr lang="en-US" smtClean="0"/>
+              <a:t>Logged in features</a:t>
+            </a:r>
+            <a:endParaRPr lang="en-US" dirty="0" smtClean="0"/>
           </a:p>
           <a:p>
             <a:pPr marL="457200" indent="-457200">
@@ -4431,7 +4432,7 @@
           </a:p>
           <a:p>
             <a:r>
-              <a:rPr lang="en-US" smtClean="0"/>
+              <a:rPr lang="en-US" dirty="0" smtClean="0"/>
               <a:t>System overview</a:t>
             </a:r>
             <a:endParaRPr lang="en-US" dirty="0"/>

</xml_diff>